<commit_message>
new cfp + corrected romina's mail address
</commit_message>
<xml_diff>
--- a/images/IoT-ASAP_Logo.pptx
+++ b/images/IoT-ASAP_Logo.pptx
@@ -260,7 +260,7 @@
           <a:p>
             <a:fld id="{F3B505E5-71AA-4F56-A163-12C04BFEC044}" type="datetimeFigureOut">
               <a:rPr lang="en-US" smtClean="0"/>
-              <a:t>3/12/2020</a:t>
+              <a:t>4/25/2020</a:t>
             </a:fld>
             <a:endParaRPr lang="en-US"/>
           </a:p>
@@ -430,7 +430,7 @@
           <a:p>
             <a:fld id="{F3B505E5-71AA-4F56-A163-12C04BFEC044}" type="datetimeFigureOut">
               <a:rPr lang="en-US" smtClean="0"/>
-              <a:t>3/12/2020</a:t>
+              <a:t>4/25/2020</a:t>
             </a:fld>
             <a:endParaRPr lang="en-US"/>
           </a:p>
@@ -610,7 +610,7 @@
           <a:p>
             <a:fld id="{F3B505E5-71AA-4F56-A163-12C04BFEC044}" type="datetimeFigureOut">
               <a:rPr lang="en-US" smtClean="0"/>
-              <a:t>3/12/2020</a:t>
+              <a:t>4/25/2020</a:t>
             </a:fld>
             <a:endParaRPr lang="en-US"/>
           </a:p>
@@ -780,7 +780,7 @@
           <a:p>
             <a:fld id="{F3B505E5-71AA-4F56-A163-12C04BFEC044}" type="datetimeFigureOut">
               <a:rPr lang="en-US" smtClean="0"/>
-              <a:t>3/12/2020</a:t>
+              <a:t>4/25/2020</a:t>
             </a:fld>
             <a:endParaRPr lang="en-US"/>
           </a:p>
@@ -1024,7 +1024,7 @@
           <a:p>
             <a:fld id="{F3B505E5-71AA-4F56-A163-12C04BFEC044}" type="datetimeFigureOut">
               <a:rPr lang="en-US" smtClean="0"/>
-              <a:t>3/12/2020</a:t>
+              <a:t>4/25/2020</a:t>
             </a:fld>
             <a:endParaRPr lang="en-US"/>
           </a:p>
@@ -1256,7 +1256,7 @@
           <a:p>
             <a:fld id="{F3B505E5-71AA-4F56-A163-12C04BFEC044}" type="datetimeFigureOut">
               <a:rPr lang="en-US" smtClean="0"/>
-              <a:t>3/12/2020</a:t>
+              <a:t>4/25/2020</a:t>
             </a:fld>
             <a:endParaRPr lang="en-US"/>
           </a:p>
@@ -1623,7 +1623,7 @@
           <a:p>
             <a:fld id="{F3B505E5-71AA-4F56-A163-12C04BFEC044}" type="datetimeFigureOut">
               <a:rPr lang="en-US" smtClean="0"/>
-              <a:t>3/12/2020</a:t>
+              <a:t>4/25/2020</a:t>
             </a:fld>
             <a:endParaRPr lang="en-US"/>
           </a:p>
@@ -1741,7 +1741,7 @@
           <a:p>
             <a:fld id="{F3B505E5-71AA-4F56-A163-12C04BFEC044}" type="datetimeFigureOut">
               <a:rPr lang="en-US" smtClean="0"/>
-              <a:t>3/12/2020</a:t>
+              <a:t>4/25/2020</a:t>
             </a:fld>
             <a:endParaRPr lang="en-US"/>
           </a:p>
@@ -1836,7 +1836,7 @@
           <a:p>
             <a:fld id="{F3B505E5-71AA-4F56-A163-12C04BFEC044}" type="datetimeFigureOut">
               <a:rPr lang="en-US" smtClean="0"/>
-              <a:t>3/12/2020</a:t>
+              <a:t>4/25/2020</a:t>
             </a:fld>
             <a:endParaRPr lang="en-US"/>
           </a:p>
@@ -2113,7 +2113,7 @@
           <a:p>
             <a:fld id="{F3B505E5-71AA-4F56-A163-12C04BFEC044}" type="datetimeFigureOut">
               <a:rPr lang="en-US" smtClean="0"/>
-              <a:t>3/12/2020</a:t>
+              <a:t>4/25/2020</a:t>
             </a:fld>
             <a:endParaRPr lang="en-US"/>
           </a:p>
@@ -2370,7 +2370,7 @@
           <a:p>
             <a:fld id="{F3B505E5-71AA-4F56-A163-12C04BFEC044}" type="datetimeFigureOut">
               <a:rPr lang="en-US" smtClean="0"/>
-              <a:t>3/12/2020</a:t>
+              <a:t>4/25/2020</a:t>
             </a:fld>
             <a:endParaRPr lang="en-US"/>
           </a:p>
@@ -2435,9 +2435,14 @@
 <p:sldMaster xmlns:a="http://schemas.openxmlformats.org/drawingml/2006/main" xmlns:r="http://schemas.openxmlformats.org/officeDocument/2006/relationships" xmlns:p="http://schemas.openxmlformats.org/presentationml/2006/main">
   <p:cSld>
     <p:bg>
-      <p:bgRef idx="1001">
-        <a:schemeClr val="bg1"/>
-      </p:bgRef>
+      <p:bgPr>
+        <a:solidFill>
+          <a:schemeClr val="bg1">
+            <a:alpha val="0"/>
+          </a:schemeClr>
+        </a:solidFill>
+        <a:effectLst/>
+      </p:bgPr>
     </p:bg>
     <p:spTree>
       <p:nvGrpSpPr>
@@ -2583,7 +2588,7 @@
           <a:p>
             <a:fld id="{F3B505E5-71AA-4F56-A163-12C04BFEC044}" type="datetimeFigureOut">
               <a:rPr lang="en-US" smtClean="0"/>
-              <a:t>3/12/2020</a:t>
+              <a:t>4/25/2020</a:t>
             </a:fld>
             <a:endParaRPr lang="en-US"/>
           </a:p>
@@ -5250,16 +5255,6 @@
 <file path=ppt/slides/slide3.xml><?xml version="1.0" encoding="utf-8"?>
 <p:sld xmlns:a="http://schemas.openxmlformats.org/drawingml/2006/main" xmlns:r="http://schemas.openxmlformats.org/officeDocument/2006/relationships" xmlns:p="http://schemas.openxmlformats.org/presentationml/2006/main">
   <p:cSld>
-    <p:bg>
-      <p:bgPr>
-        <a:solidFill>
-          <a:schemeClr val="bg1">
-            <a:alpha val="0"/>
-          </a:schemeClr>
-        </a:solidFill>
-        <a:effectLst/>
-      </p:bgPr>
-    </p:bg>
     <p:spTree>
       <p:nvGrpSpPr>
         <p:cNvPr id="1" name=""/>
@@ -7704,17 +7699,6 @@
 <file path=ppt/slides/slide5.xml><?xml version="1.0" encoding="utf-8"?>
 <p:sld xmlns:a="http://schemas.openxmlformats.org/drawingml/2006/main" xmlns:r="http://schemas.openxmlformats.org/officeDocument/2006/relationships" xmlns:p="http://schemas.openxmlformats.org/presentationml/2006/main">
   <p:cSld>
-    <p:bg>
-      <p:bgPr>
-        <a:solidFill>
-          <a:schemeClr val="tx1">
-            <a:lumMod val="65000"/>
-            <a:lumOff val="35000"/>
-          </a:schemeClr>
-        </a:solidFill>
-        <a:effectLst/>
-      </p:bgPr>
-    </p:bg>
     <p:spTree>
       <p:nvGrpSpPr>
         <p:cNvPr id="1" name=""/>
@@ -8937,17 +8921,6 @@
 <file path=ppt/slides/slide6.xml><?xml version="1.0" encoding="utf-8"?>
 <p:sld xmlns:a="http://schemas.openxmlformats.org/drawingml/2006/main" xmlns:r="http://schemas.openxmlformats.org/officeDocument/2006/relationships" xmlns:p="http://schemas.openxmlformats.org/presentationml/2006/main">
   <p:cSld>
-    <p:bg>
-      <p:bgPr>
-        <a:solidFill>
-          <a:schemeClr val="tx1">
-            <a:lumMod val="65000"/>
-            <a:lumOff val="35000"/>
-          </a:schemeClr>
-        </a:solidFill>
-        <a:effectLst/>
-      </p:bgPr>
-    </p:bg>
     <p:spTree>
       <p:nvGrpSpPr>
         <p:cNvPr id="1" name=""/>
@@ -10170,16 +10143,6 @@
 <file path=ppt/slides/slide7.xml><?xml version="1.0" encoding="utf-8"?>
 <p:sld xmlns:a="http://schemas.openxmlformats.org/drawingml/2006/main" xmlns:r="http://schemas.openxmlformats.org/officeDocument/2006/relationships" xmlns:p="http://schemas.openxmlformats.org/presentationml/2006/main">
   <p:cSld>
-    <p:bg>
-      <p:bgPr>
-        <a:solidFill>
-          <a:schemeClr val="bg1">
-            <a:alpha val="0"/>
-          </a:schemeClr>
-        </a:solidFill>
-        <a:effectLst/>
-      </p:bgPr>
-    </p:bg>
     <p:spTree>
       <p:nvGrpSpPr>
         <p:cNvPr id="1" name=""/>

</xml_diff>